<commit_message>
Add slides to PPT
</commit_message>
<xml_diff>
--- a/Git Gud at Git.pptx
+++ b/Git Gud at Git.pptx
@@ -115,7 +115,16 @@
       </a:defRPr>
     </a:lvl9pPr>
   </p:defaultTextStyle>
+  <p:extLst>
+    <p:ext uri="{EFAFB233-063F-42B5-8137-9DF3F51BA10A}">
+      <p15:sldGuideLst xmlns:p15="http://schemas.microsoft.com/office/powerpoint/2012/main"/>
+    </p:ext>
+  </p:extLst>
 </p:presentation>
+</file>
+
+<file path=ppt/revisionInfo.xml><?xml version="1.0" encoding="utf-8"?>
+<p1510:revInfo xmlns:a="http://schemas.openxmlformats.org/drawingml/2006/main" xmlns:r="http://schemas.openxmlformats.org/officeDocument/2006/relationships" xmlns:p1510="http://schemas.microsoft.com/office/powerpoint/2015/10/main"/>
 </file>
 
 <file path=ppt/notesMasters/notesMaster1.xml><?xml version="1.0" encoding="utf-8"?>
@@ -5767,6 +5776,102 @@
           </a:prstGeom>
         </p:spPr>
       </p:pic>
+      <p:pic>
+        <p:nvPicPr>
+          <p:cNvPr id="1026" name="Picture 2" descr="https://c.s-microsoft.com/en-us/CMSImages/ImgOne.jpg?version=D418E733-821C-244F-37F9-DC865BDEFEC0">
+            <a:extLst>
+              <a:ext uri="{FF2B5EF4-FFF2-40B4-BE49-F238E27FC236}">
+                <a16:creationId xmlns:a16="http://schemas.microsoft.com/office/drawing/2014/main" id="{692ACE44-0B8C-4670-8806-7CFB498149E4}"/>
+              </a:ext>
+            </a:extLst>
+          </p:cNvPr>
+          <p:cNvPicPr>
+            <a:picLocks noChangeAspect="1" noChangeArrowheads="1"/>
+          </p:cNvPicPr>
+          <p:nvPr/>
+        </p:nvPicPr>
+        <p:blipFill rotWithShape="1">
+          <a:blip r:embed="rId7">
+            <a:extLst>
+              <a:ext uri="{28A0092B-C50C-407E-A947-70E740481C1C}">
+                <a14:useLocalDpi xmlns:a14="http://schemas.microsoft.com/office/drawing/2010/main" val="0"/>
+              </a:ext>
+            </a:extLst>
+          </a:blip>
+          <a:srcRect l="13383" t="35594" r="13107" b="33418"/>
+          <a:stretch/>
+        </p:blipFill>
+        <p:spPr bwMode="auto">
+          <a:xfrm>
+            <a:off x="4270344" y="1831583"/>
+            <a:ext cx="1567467" cy="381707"/>
+          </a:xfrm>
+          <a:prstGeom prst="rect">
+            <a:avLst/>
+          </a:prstGeom>
+          <a:noFill/>
+          <a:extLst>
+            <a:ext uri="{909E8E84-426E-40DD-AFC4-6F175D3DCCD1}">
+              <a14:hiddenFill xmlns:a14="http://schemas.microsoft.com/office/drawing/2010/main">
+                <a:solidFill>
+                  <a:srgbClr val="FFFFFF"/>
+                </a:solidFill>
+              </a14:hiddenFill>
+            </a:ext>
+          </a:extLst>
+        </p:spPr>
+      </p:pic>
+      <p:sp>
+        <p:nvSpPr>
+          <p:cNvPr id="2" name="TextBox 1">
+            <a:extLst>
+              <a:ext uri="{FF2B5EF4-FFF2-40B4-BE49-F238E27FC236}">
+                <a16:creationId xmlns:a16="http://schemas.microsoft.com/office/drawing/2014/main" id="{E400105F-0247-46D7-8648-C66E3B4CA8CB}"/>
+              </a:ext>
+            </a:extLst>
+          </p:cNvPr>
+          <p:cNvSpPr txBox="1"/>
+          <p:nvPr/>
+        </p:nvSpPr>
+        <p:spPr>
+          <a:xfrm>
+            <a:off x="3910544" y="1812099"/>
+            <a:ext cx="425116" cy="369332"/>
+          </a:xfrm>
+          <a:prstGeom prst="rect">
+            <a:avLst/>
+          </a:prstGeom>
+          <a:noFill/>
+        </p:spPr>
+        <p:txBody>
+          <a:bodyPr wrap="none" rtlCol="0">
+            <a:spAutoFit/>
+          </a:bodyPr>
+          <a:lstStyle/>
+          <a:p>
+            <a:r>
+              <a:rPr lang="en-US" b="1" dirty="0">
+                <a:solidFill>
+                  <a:schemeClr val="bg1">
+                    <a:lumMod val="50000"/>
+                  </a:schemeClr>
+                </a:solidFill>
+              </a:rPr>
+              <a:t>Ft</a:t>
+            </a:r>
+            <a:r>
+              <a:rPr lang="en-US" dirty="0">
+                <a:solidFill>
+                  <a:schemeClr val="bg1">
+                    <a:lumMod val="50000"/>
+                  </a:schemeClr>
+                </a:solidFill>
+              </a:rPr>
+              <a:t>.</a:t>
+            </a:r>
+          </a:p>
+        </p:txBody>
+      </p:sp>
     </p:spTree>
     <p:extLst>
       <p:ext uri="{BB962C8B-B14F-4D97-AF65-F5344CB8AC3E}">

</xml_diff>

<commit_message>
Add lesson 1 to powerpoint
</commit_message>
<xml_diff>
--- a/Git Gud at Git.pptx
+++ b/Git Gud at Git.pptx
@@ -209,7 +209,7 @@
           <a:p>
             <a:fld id="{D22C7FF8-B6BF-42E6-87B9-F9119C9E1264}" type="datetimeFigureOut">
               <a:rPr lang="en-US" smtClean="0"/>
-              <a:t>6/25/2018</a:t>
+              <a:t>6/26/2018</a:t>
             </a:fld>
             <a:endParaRPr lang="en-US" dirty="0"/>
           </a:p>
@@ -1105,7 +1105,7 @@
           <a:p>
             <a:fld id="{2ACC3B57-9C54-4316-895A-185D8B130371}" type="datetimeFigureOut">
               <a:rPr lang="en-US" smtClean="0"/>
-              <a:t>6/25/2018</a:t>
+              <a:t>6/26/2018</a:t>
             </a:fld>
             <a:endParaRPr lang="en-US" dirty="0"/>
           </a:p>
@@ -1303,7 +1303,7 @@
           <a:p>
             <a:fld id="{2ACC3B57-9C54-4316-895A-185D8B130371}" type="datetimeFigureOut">
               <a:rPr lang="en-US" smtClean="0"/>
-              <a:t>6/25/2018</a:t>
+              <a:t>6/26/2018</a:t>
             </a:fld>
             <a:endParaRPr lang="en-US" dirty="0"/>
           </a:p>
@@ -1511,7 +1511,7 @@
           <a:p>
             <a:fld id="{2ACC3B57-9C54-4316-895A-185D8B130371}" type="datetimeFigureOut">
               <a:rPr lang="en-US" smtClean="0"/>
-              <a:t>6/25/2018</a:t>
+              <a:t>6/26/2018</a:t>
             </a:fld>
             <a:endParaRPr lang="en-US" dirty="0"/>
           </a:p>
@@ -1709,7 +1709,7 @@
           <a:p>
             <a:fld id="{2ACC3B57-9C54-4316-895A-185D8B130371}" type="datetimeFigureOut">
               <a:rPr lang="en-US" smtClean="0"/>
-              <a:t>6/25/2018</a:t>
+              <a:t>6/26/2018</a:t>
             </a:fld>
             <a:endParaRPr lang="en-US" dirty="0"/>
           </a:p>
@@ -1984,7 +1984,7 @@
           <a:p>
             <a:fld id="{2ACC3B57-9C54-4316-895A-185D8B130371}" type="datetimeFigureOut">
               <a:rPr lang="en-US" smtClean="0"/>
-              <a:t>6/25/2018</a:t>
+              <a:t>6/26/2018</a:t>
             </a:fld>
             <a:endParaRPr lang="en-US" dirty="0"/>
           </a:p>
@@ -2249,7 +2249,7 @@
           <a:p>
             <a:fld id="{2ACC3B57-9C54-4316-895A-185D8B130371}" type="datetimeFigureOut">
               <a:rPr lang="en-US" smtClean="0"/>
-              <a:t>6/25/2018</a:t>
+              <a:t>6/26/2018</a:t>
             </a:fld>
             <a:endParaRPr lang="en-US" dirty="0"/>
           </a:p>
@@ -2661,7 +2661,7 @@
           <a:p>
             <a:fld id="{2ACC3B57-9C54-4316-895A-185D8B130371}" type="datetimeFigureOut">
               <a:rPr lang="en-US" smtClean="0"/>
-              <a:t>6/25/2018</a:t>
+              <a:t>6/26/2018</a:t>
             </a:fld>
             <a:endParaRPr lang="en-US" dirty="0"/>
           </a:p>
@@ -2802,7 +2802,7 @@
           <a:p>
             <a:fld id="{2ACC3B57-9C54-4316-895A-185D8B130371}" type="datetimeFigureOut">
               <a:rPr lang="en-US" smtClean="0"/>
-              <a:t>6/25/2018</a:t>
+              <a:t>6/26/2018</a:t>
             </a:fld>
             <a:endParaRPr lang="en-US" dirty="0"/>
           </a:p>
@@ -2915,7 +2915,7 @@
           <a:p>
             <a:fld id="{2ACC3B57-9C54-4316-895A-185D8B130371}" type="datetimeFigureOut">
               <a:rPr lang="en-US" smtClean="0"/>
-              <a:t>6/25/2018</a:t>
+              <a:t>6/26/2018</a:t>
             </a:fld>
             <a:endParaRPr lang="en-US" dirty="0"/>
           </a:p>
@@ -3226,7 +3226,7 @@
           <a:p>
             <a:fld id="{2ACC3B57-9C54-4316-895A-185D8B130371}" type="datetimeFigureOut">
               <a:rPr lang="en-US" smtClean="0"/>
-              <a:t>6/25/2018</a:t>
+              <a:t>6/26/2018</a:t>
             </a:fld>
             <a:endParaRPr lang="en-US" dirty="0"/>
           </a:p>
@@ -3514,7 +3514,7 @@
           <a:p>
             <a:fld id="{2ACC3B57-9C54-4316-895A-185D8B130371}" type="datetimeFigureOut">
               <a:rPr lang="en-US" smtClean="0"/>
-              <a:t>6/25/2018</a:t>
+              <a:t>6/26/2018</a:t>
             </a:fld>
             <a:endParaRPr lang="en-US" dirty="0"/>
           </a:p>
@@ -3755,7 +3755,7 @@
           <a:p>
             <a:fld id="{2ACC3B57-9C54-4316-895A-185D8B130371}" type="datetimeFigureOut">
               <a:rPr lang="en-US" smtClean="0"/>
-              <a:t>6/25/2018</a:t>
+              <a:t>6/26/2018</a:t>
             </a:fld>
             <a:endParaRPr lang="en-US" dirty="0"/>
           </a:p>
@@ -6284,6 +6284,216 @@
           <a:chExt cx="0" cy="0"/>
         </a:xfrm>
       </p:grpSpPr>
+      <p:pic>
+        <p:nvPicPr>
+          <p:cNvPr id="1026" name="Picture 2" descr="Image result for git commit push">
+            <a:extLst>
+              <a:ext uri="{FF2B5EF4-FFF2-40B4-BE49-F238E27FC236}">
+                <a16:creationId xmlns:a16="http://schemas.microsoft.com/office/drawing/2014/main" id="{AF200D44-C4DA-427B-80A2-4DE4ED8ECA8B}"/>
+              </a:ext>
+            </a:extLst>
+          </p:cNvPr>
+          <p:cNvPicPr>
+            <a:picLocks noChangeAspect="1" noChangeArrowheads="1"/>
+          </p:cNvPicPr>
+          <p:nvPr/>
+        </p:nvPicPr>
+        <p:blipFill>
+          <a:blip r:embed="rId2">
+            <a:extLst>
+              <a:ext uri="{28A0092B-C50C-407E-A947-70E740481C1C}">
+                <a14:useLocalDpi xmlns:a14="http://schemas.microsoft.com/office/drawing/2010/main" val="0"/>
+              </a:ext>
+            </a:extLst>
+          </a:blip>
+          <a:srcRect/>
+          <a:stretch>
+            <a:fillRect/>
+          </a:stretch>
+        </p:blipFill>
+        <p:spPr bwMode="auto">
+          <a:xfrm>
+            <a:off x="3797300" y="0"/>
+            <a:ext cx="8394700" cy="6858000"/>
+          </a:xfrm>
+          <a:prstGeom prst="rect">
+            <a:avLst/>
+          </a:prstGeom>
+          <a:noFill/>
+          <a:extLst>
+            <a:ext uri="{909E8E84-426E-40DD-AFC4-6F175D3DCCD1}">
+              <a14:hiddenFill xmlns:a14="http://schemas.microsoft.com/office/drawing/2010/main">
+                <a:solidFill>
+                  <a:srgbClr val="FFFFFF"/>
+                </a:solidFill>
+              </a14:hiddenFill>
+            </a:ext>
+          </a:extLst>
+        </p:spPr>
+      </p:pic>
+      <p:sp>
+        <p:nvSpPr>
+          <p:cNvPr id="2" name="TextBox 1">
+            <a:extLst>
+              <a:ext uri="{FF2B5EF4-FFF2-40B4-BE49-F238E27FC236}">
+                <a16:creationId xmlns:a16="http://schemas.microsoft.com/office/drawing/2014/main" id="{FED7273D-FED7-49E1-A43C-F11412A4A94B}"/>
+              </a:ext>
+            </a:extLst>
+          </p:cNvPr>
+          <p:cNvSpPr txBox="1"/>
+          <p:nvPr/>
+        </p:nvSpPr>
+        <p:spPr>
+          <a:xfrm>
+            <a:off x="250560" y="346841"/>
+            <a:ext cx="3546740" cy="923330"/>
+          </a:xfrm>
+          <a:prstGeom prst="rect">
+            <a:avLst/>
+          </a:prstGeom>
+          <a:noFill/>
+        </p:spPr>
+        <p:txBody>
+          <a:bodyPr wrap="none" rtlCol="0">
+            <a:spAutoFit/>
+          </a:bodyPr>
+          <a:lstStyle/>
+          <a:p>
+            <a:pPr algn="ctr"/>
+            <a:r>
+              <a:rPr lang="en-US" sz="5400" dirty="0">
+                <a:latin typeface="Franklin Gothic Heavy" panose="020B0903020102020204" pitchFamily="34" charset="0"/>
+              </a:rPr>
+              <a:t>Exercise 1</a:t>
+            </a:r>
+            <a:endParaRPr lang="en-US" sz="5400" dirty="0"/>
+          </a:p>
+        </p:txBody>
+      </p:sp>
+      <p:sp>
+        <p:nvSpPr>
+          <p:cNvPr id="3" name="TextBox 2">
+            <a:extLst>
+              <a:ext uri="{FF2B5EF4-FFF2-40B4-BE49-F238E27FC236}">
+                <a16:creationId xmlns:a16="http://schemas.microsoft.com/office/drawing/2014/main" id="{8A76D6F0-770A-4EB0-83DB-BEEE2878A806}"/>
+              </a:ext>
+            </a:extLst>
+          </p:cNvPr>
+          <p:cNvSpPr txBox="1"/>
+          <p:nvPr/>
+        </p:nvSpPr>
+        <p:spPr>
+          <a:xfrm>
+            <a:off x="548788" y="4740166"/>
+            <a:ext cx="2950295" cy="1323439"/>
+          </a:xfrm>
+          <a:prstGeom prst="rect">
+            <a:avLst/>
+          </a:prstGeom>
+          <a:noFill/>
+        </p:spPr>
+        <p:txBody>
+          <a:bodyPr wrap="none" rtlCol="0">
+            <a:spAutoFit/>
+          </a:bodyPr>
+          <a:lstStyle/>
+          <a:p>
+            <a:pPr algn="ctr"/>
+            <a:r>
+              <a:rPr lang="en-US" sz="4000" dirty="0">
+                <a:latin typeface="Franklin Gothic Demi" panose="020B0703020102020204" pitchFamily="34" charset="0"/>
+              </a:rPr>
+              <a:t>Instructions</a:t>
+            </a:r>
+            <a:br>
+              <a:rPr lang="en-US" sz="4000" dirty="0">
+                <a:latin typeface="Franklin Gothic Demi" panose="020B0703020102020204" pitchFamily="34" charset="0"/>
+              </a:rPr>
+            </a:br>
+            <a:r>
+              <a:rPr lang="en-US" sz="4000" dirty="0">
+                <a:latin typeface="Franklin Gothic Demi" panose="020B0703020102020204" pitchFamily="34" charset="0"/>
+              </a:rPr>
+              <a:t>Found </a:t>
+            </a:r>
+            <a:r>
+              <a:rPr lang="en-US" sz="4000" dirty="0">
+                <a:latin typeface="Franklin Gothic Demi" panose="020B0703020102020204" pitchFamily="34" charset="0"/>
+                <a:hlinkClick r:id="rId3"/>
+              </a:rPr>
+              <a:t>HERE</a:t>
+            </a:r>
+            <a:endParaRPr lang="en-US" sz="4000" dirty="0">
+              <a:latin typeface="Franklin Gothic Demi" panose="020B0703020102020204" pitchFamily="34" charset="0"/>
+            </a:endParaRPr>
+          </a:p>
+        </p:txBody>
+      </p:sp>
+      <p:sp>
+        <p:nvSpPr>
+          <p:cNvPr id="5" name="TextBox 4">
+            <a:extLst>
+              <a:ext uri="{FF2B5EF4-FFF2-40B4-BE49-F238E27FC236}">
+                <a16:creationId xmlns:a16="http://schemas.microsoft.com/office/drawing/2014/main" id="{554273EB-C871-42C7-AA63-818586B84A61}"/>
+              </a:ext>
+            </a:extLst>
+          </p:cNvPr>
+          <p:cNvSpPr txBox="1"/>
+          <p:nvPr/>
+        </p:nvSpPr>
+        <p:spPr>
+          <a:xfrm>
+            <a:off x="211580" y="1681729"/>
+            <a:ext cx="3624710" cy="2554545"/>
+          </a:xfrm>
+          <a:prstGeom prst="rect">
+            <a:avLst/>
+          </a:prstGeom>
+          <a:noFill/>
+        </p:spPr>
+        <p:txBody>
+          <a:bodyPr wrap="none" rtlCol="0">
+            <a:spAutoFit/>
+          </a:bodyPr>
+          <a:lstStyle/>
+          <a:p>
+            <a:pPr algn="ctr"/>
+            <a:r>
+              <a:rPr lang="en-US" sz="4000" dirty="0">
+                <a:latin typeface="Franklin Gothic Demi" panose="020B0703020102020204" pitchFamily="34" charset="0"/>
+              </a:rPr>
+              <a:t>Create a Repo</a:t>
+            </a:r>
+            <a:br>
+              <a:rPr lang="en-US" sz="4000" dirty="0">
+                <a:latin typeface="Franklin Gothic Demi" panose="020B0703020102020204" pitchFamily="34" charset="0"/>
+              </a:rPr>
+            </a:br>
+            <a:br>
+              <a:rPr lang="en-US" sz="4000" dirty="0">
+                <a:latin typeface="Franklin Gothic Demi" panose="020B0703020102020204" pitchFamily="34" charset="0"/>
+              </a:rPr>
+            </a:br>
+            <a:r>
+              <a:rPr lang="en-US" sz="4000" dirty="0">
+                <a:latin typeface="Franklin Gothic Demi" panose="020B0703020102020204" pitchFamily="34" charset="0"/>
+              </a:rPr>
+              <a:t>Clone, Commit,</a:t>
+            </a:r>
+            <a:br>
+              <a:rPr lang="en-US" sz="4000" dirty="0">
+                <a:latin typeface="Franklin Gothic Demi" panose="020B0703020102020204" pitchFamily="34" charset="0"/>
+              </a:rPr>
+            </a:br>
+            <a:r>
+              <a:rPr lang="en-US" sz="4000" dirty="0">
+                <a:latin typeface="Franklin Gothic Demi" panose="020B0703020102020204" pitchFamily="34" charset="0"/>
+              </a:rPr>
+              <a:t>Push</a:t>
+            </a:r>
+          </a:p>
+        </p:txBody>
+      </p:sp>
     </p:spTree>
     <p:extLst>
       <p:ext uri="{BB962C8B-B14F-4D97-AF65-F5344CB8AC3E}">

</xml_diff>